<commit_message>
Recuperacao da versao anterior do PITCH
</commit_message>
<xml_diff>
--- a/PastaDocumentos/PITCH.pptx
+++ b/PastaDocumentos/PITCH.pptx
@@ -3396,10 +3396,10 @@
       </p:sp>
       <p:sp>
         <p:nvSpPr>
-          <p:cNvPr id="4" name="Rectangle 3">
-            <a:extLst>
-              <a:ext uri="{FF2B5EF4-FFF2-40B4-BE49-F238E27FC236}">
-                <a16:creationId xmlns:a16="http://schemas.microsoft.com/office/drawing/2014/main" id="{CC28F57B-7A73-4509-8A15-827A9A147EED}"/>
+          <p:cNvPr id="4" name="Oval 3">
+            <a:extLst>
+              <a:ext uri="{FF2B5EF4-FFF2-40B4-BE49-F238E27FC236}">
+                <a16:creationId xmlns:a16="http://schemas.microsoft.com/office/drawing/2014/main" id="{5363C21D-46BE-43FD-AC5B-7246189194A3}"/>
               </a:ext>
             </a:extLst>
           </p:cNvPr>
@@ -3408,15 +3408,12 @@
         </p:nvSpPr>
         <p:spPr>
           <a:xfrm>
-            <a:off x="1277007" y="3957145"/>
-            <a:ext cx="2790496" cy="1891862"/>
+            <a:off x="8245366" y="3429000"/>
+            <a:ext cx="1828800" cy="1655762"/>
           </a:xfrm>
-          <a:prstGeom prst="rect">
+          <a:prstGeom prst="ellipse">
             <a:avLst/>
           </a:prstGeom>
-          <a:solidFill>
-            <a:schemeClr val="accent2"/>
-          </a:solidFill>
         </p:spPr>
         <p:style>
           <a:lnRef idx="2">
@@ -3440,10 +3437,10 @@
           <a:p>
             <a:pPr algn="ctr"/>
             <a:r>
-              <a:rPr lang="pt-BR" dirty="0"/>
-              <a:t>LOGO</a:t>
-            </a:r>
-            <a:endParaRPr lang="en-US" dirty="0"/>
+              <a:rPr lang="pt-BR"/>
+              <a:t>LOGO DO PROJETO</a:t>
+            </a:r>
+            <a:endParaRPr lang="en-US"/>
           </a:p>
         </p:txBody>
       </p:sp>

</xml_diff>